<commit_message>
updated vsts text references and dates to January 2019
</commit_message>
<xml_diff>
--- a/Whiteboard design session/WDS trainer presentation - Continuous delivery in VSTS and Azure.pptx
+++ b/Whiteboard design session/WDS trainer presentation - Continuous delivery in VSTS and Azure.pptx
@@ -232,7 +232,7 @@
           <a:p>
             <a:fld id="{52A13B17-C506-4D51-BB37-16B365906619}" type="datetimeFigureOut">
               <a:rPr lang="en-US" smtClean="0"/>
-              <a:t>9/18/2018</a:t>
+              <a:t>1/15/19</a:t>
             </a:fld>
             <a:endParaRPr lang="en-US" dirty="0"/>
           </a:p>
@@ -1437,7 +1437,7 @@
                 <a:ea typeface="+mn-ea"/>
                 <a:cs typeface="+mn-cs"/>
               </a:rPr>
-              <a:t>Visual Studio Team Services' build and release management features are a complete end to end solution for automating builds deployment for the solutions. From there, you can customize the gates your solution needs to promote the solution from environment to environment. You're in complete control of how the CI/CD process is implemented.</a:t>
+              <a:t>Azure DevOps' build and release management features are a complete end to end solution for automating builds deployment for the solutions. From there, you can customize the gates your solution needs to promote the solution from environment to environment. You're in complete control of how the CI/CD process is implemented.</a:t>
             </a:r>
           </a:p>
           <a:p>
@@ -1451,7 +1451,7 @@
                 <a:ea typeface="+mn-ea"/>
                 <a:cs typeface="+mn-cs"/>
               </a:rPr>
-              <a:t>Once we have the build definition producing build artifacts, we create a release pipeline using the Release Management features of Visual Studio Team Services.</a:t>
+              <a:t>Once we have the build definition producing build artifacts, we create a release pipeline using the Release Management features of Azure DevOps.</a:t>
             </a:r>
           </a:p>
           <a:p>
@@ -1717,7 +1717,7 @@
                 <a:ea typeface="+mn-ea"/>
                 <a:cs typeface="+mn-cs"/>
               </a:rPr>
-              <a:t>Create a plan on how to switch the source control location from Visual Studio Team Services to GitHub.</a:t>
+              <a:t>Create a plan on how to switch the source control location from Azure DevOps to GitHub.</a:t>
             </a:r>
           </a:p>
           <a:p>
@@ -1731,7 +1731,7 @@
                 <a:ea typeface="+mn-ea"/>
                 <a:cs typeface="+mn-cs"/>
               </a:rPr>
-              <a:t>Let's assume you have already uploaded your codebase to GitHub from Visual Studio Team Services. First, start by editing your existing build definition. When you initially configured the build definition, you selected Visual Studio Team Services as the source for your code. You would now change the "Get sources" item to select GitHub. This, in turn, will require you to authenticate to GitHub (if you have not previously done so). Finally, you select the specifics for your Repository and Default branch. The rest of the build and release process remains unchanged.</a:t>
+              <a:t>Let's assume you have already uploaded your codebase to GitHub from Azure DevOps. First, start by editing your existing build definition. When you initially configured the build definition, you selected Azure DevOps as the source for your code. You would now change the "Get sources" item to select GitHub. This, in turn, will require you to authenticate to GitHub (if you have not previously done so). Finally, you select the specifics for your Repository and Default branch. The rest of the build and release process remains unchanged.</a:t>
             </a:r>
           </a:p>
           <a:p>
@@ -2341,7 +2341,7 @@
                 <a:ea typeface="+mn-ea"/>
                 <a:cs typeface="+mn-cs"/>
               </a:rPr>
-              <a:t>Create a plan on how to switch the source control location from Visual Studio Team Services to GitHub.</a:t>
+              <a:t>Create a plan on how to switch the source control location from Azure DevOps to GitHub.</a:t>
             </a:r>
           </a:p>
           <a:p>
@@ -2355,7 +2355,7 @@
                 <a:ea typeface="+mn-ea"/>
                 <a:cs typeface="+mn-cs"/>
               </a:rPr>
-              <a:t>Let’s assume you have already uploaded your codebase to GitHub from Visual Studio Team Services. First, start by editing your existing build definition. When you initially configured the build definition, you selected Visual Studio Team Services as the source for your code. You would now change the “Get sources” item to select GitHub. This, in turn, will require you to authenticate to GitHub (if you have not previously done so). Finally, you select the specifics for your Repository and Default branch. The rest of the build and release process remains unchanged.</a:t>
+              <a:t>Let’s assume you have already uploaded your codebase to GitHub from Azure DevOps. First, start by editing your existing build definition. When you initially configured the build definition, you selected Azure DevOps as the source for your code. You would now change the “Get sources” item to select GitHub. This, in turn, will require you to authenticate to GitHub (if you have not previously done so). Finally, you select the specifics for your Repository and Default branch. The rest of the build and release process remains unchanged.</a:t>
             </a:r>
           </a:p>
           <a:p>
@@ -3248,7 +3248,7 @@
                   <a:prstClr val="black"/>
                 </a:solidFill>
               </a:rPr>
-              <a:t>9/18/2018 2:53 PM</a:t>
+              <a:t>1/15/19 9:43 AM</a:t>
             </a:fld>
             <a:endParaRPr lang="en-US" dirty="0">
               <a:solidFill>
@@ -15874,7 +15874,7 @@
           <a:p>
             <a:r>
               <a:rPr lang="en-US" dirty="0"/>
-              <a:t>Continuous delivery in VSTS and Azure</a:t>
+              <a:t>Continuous delivery in Azure DevOps and Azure</a:t>
             </a:r>
           </a:p>
         </p:txBody>
@@ -16156,7 +16156,7 @@
             </a:pPr>
             <a:r>
               <a:rPr lang="en-US" sz="2800" dirty="0"/>
-              <a:t>We do not want to be locked into a specific source control repository. We are evaluating GitHub and Visual Studio Team Services and need to be able to change between them without frustrating rework.</a:t>
+              <a:t>We do not want to be locked into a specific source control repository. We are evaluating GitHub and Azure DevOps and need to be able to change between them without frustrating rework.</a:t>
             </a:r>
           </a:p>
           <a:p>
@@ -17969,7 +17969,7 @@
         <p:spPr>
           <a:xfrm>
             <a:off x="340284" y="1291421"/>
-            <a:ext cx="11127191" cy="5035225"/>
+            <a:ext cx="11127191" cy="4604337"/>
           </a:xfrm>
           <a:prstGeom prst="rect">
             <a:avLst/>
@@ -17984,7 +17984,7 @@
           <a:p>
             <a:r>
               <a:rPr lang="en-US" sz="2800" dirty="0"/>
-              <a:t>In this whiteboard design session, you will learn how to design a solution with a combination of Azure Resource Manager templates and Visual Studio Team Services (VSTS) to enable continuous delivery with several Azure PaaS services.</a:t>
+              <a:t>In this whiteboard design session, you will learn how to design a solution with a combination of Azure Resource Manager templates and Azure DevOps to enable continuous delivery with several Azure PaaS services.</a:t>
             </a:r>
           </a:p>
           <a:p>
@@ -17993,7 +17993,7 @@
           <a:p>
             <a:r>
               <a:rPr lang="en-US" sz="2800" dirty="0"/>
-              <a:t>At the end of this workshop, you will be better able to build templates to automate cloud infrastructure and reduce error-prone manual processes. In addition, you'll create an Azure Resource Manager (ARM) template to provision Azure resources, configure continuous delivery with VSTS, configure Application Insights into an application, and create a Visual Studio Team Services project and Git repository.</a:t>
+              <a:t>At the end of this workshop, you will be better able to build templates to automate cloud infrastructure and reduce error-prone manual processes. In addition, you'll create an Azure Resource Manager (ARM) template to provision Azure resources, configure continuous delivery with Azure DevOps, configure Application Insights into an application, and create an Azure DevOps project and Git repository.</a:t>
             </a:r>
           </a:p>
         </p:txBody>
@@ -18055,7 +18055,7 @@
         <p:spPr>
           <a:xfrm>
             <a:off x="269239" y="1189177"/>
-            <a:ext cx="10703561" cy="5531964"/>
+            <a:ext cx="10703561" cy="4988930"/>
           </a:xfrm>
         </p:spPr>
         <p:txBody>
@@ -18067,7 +18067,7 @@
             </a:pPr>
             <a:r>
               <a:rPr lang="en-US" dirty="0"/>
-              <a:t>Visual Studio Team Services build and release management are a complete end to end solution for automating builds deployment for the solutions</a:t>
+              <a:t>Azure DevOps build and release management are a complete end to end solution for automating builds deployment for the solutions</a:t>
             </a:r>
           </a:p>
           <a:p>
@@ -18644,7 +18644,7 @@
           <a:p>
             <a:r>
               <a:rPr lang="en-US" dirty="0"/>
-              <a:t>Switching source control from VSTS to GitHub by uploading the code base and editing the build definition.</a:t>
+              <a:t>Switching source control from Azure DevOps to GitHub by uploading the code base and editing the build definition.</a:t>
             </a:r>
           </a:p>
         </p:txBody>
@@ -18937,7 +18937,7 @@
         <p:spPr>
           <a:xfrm>
             <a:off x="340285" y="1284044"/>
-            <a:ext cx="11584795" cy="4173450"/>
+            <a:ext cx="11584795" cy="3742563"/>
           </a:xfrm>
           <a:prstGeom prst="rect">
             <a:avLst/>
@@ -18953,7 +18953,7 @@
             <a:pPr lvl="0"/>
             <a:r>
               <a:rPr lang="en-US" sz="2800" dirty="0"/>
-              <a:t>We do not want to be locked in to a specific source control repository. We are evaluating GitHub and Visual Studio Team Services and need to be able to change between them without frustrating rework.</a:t>
+              <a:t>We do not want to be locked in to a specific source control repository. We are evaluating GitHub and Azure DevOps and need to be able to change between them without frustrating rework.</a:t>
             </a:r>
           </a:p>
           <a:p>
@@ -18964,7 +18964,7 @@
             <a:pPr lvl="0"/>
             <a:r>
               <a:rPr lang="en-US" sz="2800" dirty="0"/>
-              <a:t>Both Visual Studio Team Services and GitHub support git source control repositories. VSTS supports any accessible git repository and has specific additional integrations with GitHub. As long as the customer project uses git-based source control, VSTS can be used to build and deploy the project.</a:t>
+              <a:t>Both Azure DevOps and GitHub support git source control repositories. Azure DevOps supports any accessible git repository and has specific additional integrations with GitHub. As long as the customer project uses git-based source control, Azure DevOps can be used to build and deploy the project.</a:t>
             </a:r>
           </a:p>
         </p:txBody>
@@ -19170,7 +19170,7 @@
         <p:spPr>
           <a:xfrm>
             <a:off x="340285" y="1284044"/>
-            <a:ext cx="11584795" cy="4173450"/>
+            <a:ext cx="11584795" cy="3742563"/>
           </a:xfrm>
           <a:prstGeom prst="rect">
             <a:avLst/>
@@ -19196,7 +19196,7 @@
           <a:p>
             <a:r>
               <a:rPr lang="en-US" sz="2800" dirty="0"/>
-              <a:t>If we use Visual Studio Team Service’s Release Management features, we have the opportunity to configure all of the necessary rules / approvals for ensuring a smooth and secure deployment process. The goal here is to remove human touches from the process thus increasing the stability of the release process.</a:t>
+              <a:t>If we use Azure DevOps’ Release Management features, we can configure all the necessary rules / approvals for ensuring a smooth and secure deployment process. The goal here is to remove human touches from the process thus increasing the stability of the release process.</a:t>
             </a:r>
           </a:p>
         </p:txBody>

</xml_diff>

<commit_message>
updated student & trainer guides
</commit_message>
<xml_diff>
--- a/Whiteboard design session/WDS trainer presentation - Continuous delivery in VSTS and Azure.pptx
+++ b/Whiteboard design session/WDS trainer presentation - Continuous delivery in VSTS and Azure.pptx
@@ -232,7 +232,7 @@
           <a:p>
             <a:fld id="{52A13B17-C506-4D51-BB37-16B365906619}" type="datetimeFigureOut">
               <a:rPr lang="en-US" smtClean="0"/>
-              <a:t>1/15/19</a:t>
+              <a:t>1/19/19</a:t>
             </a:fld>
             <a:endParaRPr lang="en-US" dirty="0"/>
           </a:p>
@@ -3248,7 +3248,7 @@
                   <a:prstClr val="black"/>
                 </a:solidFill>
               </a:rPr>
-              <a:t>1/15/19 10:53 AM</a:t>
+              <a:t>1/19/19 3:09 PM</a:t>
             </a:fld>
             <a:endParaRPr lang="en-US" dirty="0">
               <a:solidFill>
@@ -15874,8 +15874,13 @@
           <a:p>
             <a:r>
               <a:rPr lang="en-US" dirty="0"/>
-              <a:t>Continuous delivery in Azure DevOps and Azure</a:t>
-            </a:r>
+              <a:t>Continuous delivery in </a:t>
+            </a:r>
+            <a:r>
+              <a:rPr lang="en-US"/>
+              <a:t>Azure DevOps</a:t>
+            </a:r>
+            <a:endParaRPr lang="en-US" dirty="0"/>
           </a:p>
         </p:txBody>
       </p:sp>

</xml_diff>

<commit_message>
renamed files, updated alt-text, updated image
</commit_message>
<xml_diff>
--- a/Whiteboard design session/WDS trainer presentation - Continuous delivery in VSTS and Azure.pptx
+++ b/Whiteboard design session/WDS trainer presentation - Continuous delivery in VSTS and Azure.pptx
@@ -3248,7 +3248,7 @@
                   <a:prstClr val="black"/>
                 </a:solidFill>
               </a:rPr>
-              <a:t>1/19/19 3:09 PM</a:t>
+              <a:t>1/19/19 4:03 PM</a:t>
             </a:fld>
             <a:endParaRPr lang="en-US" dirty="0">
               <a:solidFill>
@@ -16066,7 +16066,7 @@
           </p:grpSpPr>
           <p:sp>
             <p:nvSpPr>
-              <p:cNvPr id="75" name="Rectangle 74">
+              <p:cNvPr id="75" name="Rectangle 74" descr="Tailspin Toys current process. Code is hosted in Azure DevOps, but manual processes are used to deploy the code to Azure.">
                 <a:extLst>
                   <a:ext uri="{FF2B5EF4-FFF2-40B4-BE49-F238E27FC236}">
                     <a16:creationId xmlns:a16="http://schemas.microsoft.com/office/drawing/2014/main" id="{1FD0B547-9CF5-B745-A273-5CF66CCD3AE7}"/>
@@ -18019,7 +18019,7 @@
       </p:sp>
       <p:grpSp>
         <p:nvGrpSpPr>
-          <p:cNvPr id="27" name="Group 26">
+          <p:cNvPr id="27" name="Group 26" descr="Common scenarios include the use of: Azure DevOps, Azure Repos, Azure DevOps with GitHub, Application Insights, Azure Web Apps, Azure SQL Database.">
             <a:extLst>
               <a:ext uri="{FF2B5EF4-FFF2-40B4-BE49-F238E27FC236}">
                 <a16:creationId xmlns:a16="http://schemas.microsoft.com/office/drawing/2014/main" id="{2A1C7CCD-5964-1047-B006-860517D05ADB}"/>
@@ -20632,7 +20632,7 @@
           </p:grpSpPr>
           <p:sp>
             <p:nvSpPr>
-              <p:cNvPr id="8" name="Rectangle 7">
+              <p:cNvPr id="8" name="Rectangle 7" descr="Preferred solution includes editing the code and pushing it to a branch in Azure DevOps. Then, we could create a pull request and merge the code into master to kickoff the build and release pipelines.">
                 <a:extLst>
                   <a:ext uri="{FF2B5EF4-FFF2-40B4-BE49-F238E27FC236}">
                     <a16:creationId xmlns:a16="http://schemas.microsoft.com/office/drawing/2014/main" id="{D7E7982A-8965-C64D-9A2E-E86AC50EA2F0}"/>
@@ -23838,7 +23838,7 @@
       </p:sp>
       <p:pic>
         <p:nvPicPr>
-          <p:cNvPr id="4" name="Picture 3" descr="Commit and pull icon">
+          <p:cNvPr id="4" name="Picture 3" descr="Git icon">
             <a:extLst>
               <a:ext uri="{FF2B5EF4-FFF2-40B4-BE49-F238E27FC236}">
                 <a16:creationId xmlns:a16="http://schemas.microsoft.com/office/drawing/2014/main" id="{8E52B167-72E3-4899-AA4C-C58157C4AD1B}"/>
@@ -23984,7 +23984,7 @@
       </p:sp>
       <p:pic>
         <p:nvPicPr>
-          <p:cNvPr id="4" name="Picture 3" descr="Light bulb icon">
+          <p:cNvPr id="4" name="Picture 3" descr="Application Insights icon">
             <a:extLst>
               <a:ext uri="{FF2B5EF4-FFF2-40B4-BE49-F238E27FC236}">
                 <a16:creationId xmlns:a16="http://schemas.microsoft.com/office/drawing/2014/main" id="{3775F861-57F8-4478-B34F-C8FDD455D486}"/>

</xml_diff>